<commit_message>
added week 3 slides, cleaned up week2 changes.
</commit_message>
<xml_diff>
--- a/helpsessions/week2/strings.pptx
+++ b/helpsessions/week2/strings.pptx
@@ -218,7 +218,7 @@
           <a:p>
             <a:fld id="{4D7E51A5-B478-1E40-8CBB-0DAA8831E99D}" type="datetimeFigureOut">
               <a:rPr lang="en-US" smtClean="0"/>
-              <a:t>8/31/20</a:t>
+              <a:t>9/6/20</a:t>
             </a:fld>
             <a:endParaRPr lang="en-US"/>
           </a:p>
@@ -383,7 +383,7 @@
           <a:p>
             <a:fld id="{D0ED587F-861E-6740-9643-E3DDAE89B8D6}" type="datetimeFigureOut">
               <a:rPr lang="en-US" smtClean="0"/>
-              <a:t>8/31/20</a:t>
+              <a:t>9/6/20</a:t>
             </a:fld>
             <a:endParaRPr lang="en-US"/>
           </a:p>
@@ -6877,7 +6877,7 @@
             </a:br>
             <a:r>
               <a:rPr lang="en-US" dirty="0"/>
-              <a:t>By ten end, can you name the board games of the others around you?</a:t>
+              <a:t>By the end, can you name the board games of the others around you?</a:t>
             </a:r>
           </a:p>
         </p:txBody>

</xml_diff>

<commit_message>
updated last slide, added knowledge check slide
</commit_message>
<xml_diff>
--- a/helpsessions/week2/strings.pptx
+++ b/helpsessions/week2/strings.pptx
@@ -5,17 +5,18 @@
     <p:sldMasterId id="2147483648" r:id="rId1"/>
   </p:sldMasterIdLst>
   <p:notesMasterIdLst>
-    <p:notesMasterId r:id="rId7"/>
+    <p:notesMasterId r:id="rId8"/>
   </p:notesMasterIdLst>
   <p:handoutMasterIdLst>
-    <p:handoutMasterId r:id="rId8"/>
+    <p:handoutMasterId r:id="rId9"/>
   </p:handoutMasterIdLst>
   <p:sldIdLst>
     <p:sldId id="256" r:id="rId2"/>
     <p:sldId id="258" r:id="rId3"/>
     <p:sldId id="259" r:id="rId4"/>
     <p:sldId id="257" r:id="rId5"/>
-    <p:sldId id="260" r:id="rId6"/>
+    <p:sldId id="261" r:id="rId6"/>
+    <p:sldId id="260" r:id="rId7"/>
   </p:sldIdLst>
   <p:sldSz cx="13817600" cy="7772400"/>
   <p:notesSz cx="6858000" cy="9144000"/>
@@ -8325,6 +8326,106 @@
 </file>
 
 <file path=ppt/slides/slide5.xml><?xml version="1.0" encoding="utf-8"?>
+<p:sld xmlns:a="http://schemas.openxmlformats.org/drawingml/2006/main" xmlns:r="http://schemas.openxmlformats.org/officeDocument/2006/relationships" xmlns:p="http://schemas.openxmlformats.org/presentationml/2006/main">
+  <p:cSld>
+    <p:spTree>
+      <p:nvGrpSpPr>
+        <p:cNvPr id="1" name=""/>
+        <p:cNvGrpSpPr/>
+        <p:nvPr/>
+      </p:nvGrpSpPr>
+      <p:grpSpPr>
+        <a:xfrm>
+          <a:off x="0" y="0"/>
+          <a:ext cx="0" cy="0"/>
+          <a:chOff x="0" y="0"/>
+          <a:chExt cx="0" cy="0"/>
+        </a:xfrm>
+      </p:grpSpPr>
+      <p:sp>
+        <p:nvSpPr>
+          <p:cNvPr id="2" name="Title 1">
+            <a:extLst>
+              <a:ext uri="{FF2B5EF4-FFF2-40B4-BE49-F238E27FC236}">
+                <a16:creationId xmlns:a16="http://schemas.microsoft.com/office/drawing/2014/main" id="{DE58498A-91A9-B14D-980E-7CAA88DA0949}"/>
+              </a:ext>
+            </a:extLst>
+          </p:cNvPr>
+          <p:cNvSpPr>
+            <a:spLocks noGrp="1"/>
+          </p:cNvSpPr>
+          <p:nvPr>
+            <p:ph type="title"/>
+          </p:nvPr>
+        </p:nvSpPr>
+        <p:spPr/>
+        <p:txBody>
+          <a:bodyPr/>
+          <a:lstStyle/>
+          <a:p>
+            <a:r>
+              <a:rPr lang="en-US" dirty="0"/>
+              <a:t>Knowledge Check: Work Together</a:t>
+            </a:r>
+          </a:p>
+        </p:txBody>
+      </p:sp>
+      <p:pic>
+        <p:nvPicPr>
+          <p:cNvPr id="4" name="Picture 3">
+            <a:extLst>
+              <a:ext uri="{FF2B5EF4-FFF2-40B4-BE49-F238E27FC236}">
+                <a16:creationId xmlns:a16="http://schemas.microsoft.com/office/drawing/2014/main" id="{F47FCA07-E462-0140-A446-3C0637B63772}"/>
+              </a:ext>
+            </a:extLst>
+          </p:cNvPr>
+          <p:cNvPicPr>
+            <a:picLocks noChangeAspect="1"/>
+          </p:cNvPicPr>
+          <p:nvPr/>
+        </p:nvPicPr>
+        <p:blipFill>
+          <a:blip r:embed="rId2"/>
+          <a:stretch>
+            <a:fillRect/>
+          </a:stretch>
+        </p:blipFill>
+        <p:spPr>
+          <a:xfrm>
+            <a:off x="2978728" y="1363635"/>
+            <a:ext cx="7508586" cy="5623672"/>
+          </a:xfrm>
+          <a:prstGeom prst="rect">
+            <a:avLst/>
+          </a:prstGeom>
+        </p:spPr>
+      </p:pic>
+    </p:spTree>
+    <p:extLst>
+      <p:ext uri="{BB962C8B-B14F-4D97-AF65-F5344CB8AC3E}">
+        <p14:creationId xmlns:p14="http://schemas.microsoft.com/office/powerpoint/2010/main" val="3221196742"/>
+      </p:ext>
+    </p:extLst>
+  </p:cSld>
+  <p:clrMapOvr>
+    <a:masterClrMapping/>
+  </p:clrMapOvr>
+  <mc:AlternateContent xmlns:mc="http://schemas.openxmlformats.org/markup-compatibility/2006" xmlns:p14="http://schemas.microsoft.com/office/powerpoint/2010/main">
+    <mc:Choice Requires="p14">
+      <p:transition p14:dur="300">
+        <p:fade/>
+      </p:transition>
+    </mc:Choice>
+    <mc:Fallback xmlns="">
+      <p:transition>
+        <p:fade/>
+      </p:transition>
+    </mc:Fallback>
+  </mc:AlternateContent>
+</p:sld>
+</file>
+
+<file path=ppt/slides/slide6.xml><?xml version="1.0" encoding="utf-8"?>
 <p:sld xmlns:a="http://schemas.openxmlformats.org/drawingml/2006/main" xmlns:r="http://schemas.openxmlformats.org/officeDocument/2006/relationships" xmlns:p="http://schemas.openxmlformats.org/presentationml/2006/main">
   <p:cSld>
     <p:spTree>

</xml_diff>